<commit_message>
submission instructions; fix task 16
</commit_message>
<xml_diff>
--- a/assessmentA.pptx
+++ b/assessmentA.pptx
@@ -32,6 +32,7 @@
     <p:sldId id="286" r:id="rId26"/>
     <p:sldId id="287" r:id="rId27"/>
     <p:sldId id="288" r:id="rId28"/>
+    <p:sldId id="289" r:id="rId29"/>
   </p:sldIdLst>
   <p:sldSz cx="12192000" cy="6858000"/>
   <p:notesSz cx="6858000" cy="9144000"/>
@@ -4447,7 +4448,7 @@
                 <a:ea typeface="+mj-ea"/>
                 <a:cs typeface="+mj-cs"/>
               </a:rPr>
-              <a:t> and returns the amplitude of </a:t>
+              <a:t> and returns the range of </a:t>
             </a:r>
             <a:r>
               <a:rPr lang="en-GB" sz="2400" dirty="0">
@@ -6419,7 +6420,7 @@
         <p:spPr>
           <a:xfrm>
             <a:off x="696000" y="366623"/>
-            <a:ext cx="10800000" cy="4647426"/>
+            <a:ext cx="10800000" cy="5386090"/>
           </a:xfrm>
           <a:prstGeom prst="rect">
             <a:avLst/>
@@ -6560,7 +6561,7 @@
                 <a:ea typeface="+mj-ea"/>
                 <a:cs typeface="+mj-cs"/>
               </a:rPr>
-              <a:t> and returns the same vector after removing the occurrences of its most common element:</a:t>
+              <a:t> and returns the same vector after removing all occurrences of its most common elements:</a:t>
             </a:r>
           </a:p>
           <a:p>
@@ -6722,7 +6723,7 @@
                 <a:ea typeface="+mj-ea"/>
                 <a:cs typeface="+mj-cs"/>
               </a:rPr>
-              <a:t>Miiippi</a:t>
+              <a:t>Mpp</a:t>
             </a:r>
             <a:endParaRPr lang="en-GB" sz="2400" dirty="0">
               <a:solidFill>
@@ -6732,6 +6733,76 @@
               <a:ea typeface="+mj-ea"/>
               <a:cs typeface="+mj-cs"/>
             </a:endParaRPr>
+          </a:p>
+          <a:p>
+            <a:r>
+              <a:rPr lang="en-GB" sz="2400" dirty="0">
+                <a:solidFill>
+                  <a:prstClr val="black"/>
+                </a:solidFill>
+                <a:latin typeface="APL385 Unicode" panose="020B0709000202000203" pitchFamily="49" charset="0"/>
+                <a:ea typeface="+mj-ea"/>
+                <a:cs typeface="+mj-cs"/>
+              </a:rPr>
+              <a:t>     </a:t>
+            </a:r>
+            <a:r>
+              <a:rPr lang="en-GB" sz="2400" dirty="0" err="1">
+                <a:solidFill>
+                  <a:prstClr val="black"/>
+                </a:solidFill>
+                <a:latin typeface="APL385 Unicode" panose="020B0709000202000203" pitchFamily="49" charset="0"/>
+                <a:ea typeface="+mj-ea"/>
+                <a:cs typeface="+mj-cs"/>
+              </a:rPr>
+              <a:t>RemoveExtra</a:t>
+            </a:r>
+            <a:r>
+              <a:rPr lang="en-GB" sz="2400" dirty="0">
+                <a:solidFill>
+                  <a:prstClr val="black"/>
+                </a:solidFill>
+                <a:latin typeface="APL385 Unicode" panose="020B0709000202000203" pitchFamily="49" charset="0"/>
+                <a:ea typeface="+mj-ea"/>
+                <a:cs typeface="+mj-cs"/>
+              </a:rPr>
+              <a:t> '</a:t>
+            </a:r>
+            <a:r>
+              <a:rPr lang="en-GB" sz="2400" dirty="0" err="1">
+                <a:solidFill>
+                  <a:prstClr val="black"/>
+                </a:solidFill>
+                <a:latin typeface="APL385 Unicode" panose="020B0709000202000203" pitchFamily="49" charset="0"/>
+                <a:ea typeface="+mj-ea"/>
+                <a:cs typeface="+mj-cs"/>
+              </a:rPr>
+              <a:t>aaeeoox</a:t>
+            </a:r>
+            <a:r>
+              <a:rPr lang="en-GB" sz="2400" dirty="0">
+                <a:solidFill>
+                  <a:prstClr val="black"/>
+                </a:solidFill>
+                <a:latin typeface="APL385 Unicode" panose="020B0709000202000203" pitchFamily="49" charset="0"/>
+                <a:ea typeface="+mj-ea"/>
+                <a:cs typeface="+mj-cs"/>
+              </a:rPr>
+              <a:t>'</a:t>
+            </a:r>
+          </a:p>
+          <a:p>
+            <a:r>
+              <a:rPr lang="en-GB" sz="2400" dirty="0">
+                <a:solidFill>
+                  <a:prstClr val="black"/>
+                </a:solidFill>
+                <a:latin typeface="APL385 Unicode" panose="020B0709000202000203" pitchFamily="49" charset="0"/>
+                <a:ea typeface="+mj-ea"/>
+                <a:cs typeface="+mj-cs"/>
+              </a:rPr>
+              <a:t>x</a:t>
+            </a:r>
           </a:p>
         </p:txBody>
       </p:sp>
@@ -11246,6 +11317,241 @@
     <p:extLst>
       <p:ext uri="{BB962C8B-B14F-4D97-AF65-F5344CB8AC3E}">
         <p14:creationId xmlns:p14="http://schemas.microsoft.com/office/powerpoint/2010/main" val="1442737486"/>
+      </p:ext>
+    </p:extLst>
+  </p:cSld>
+  <p:clrMapOvr>
+    <a:masterClrMapping/>
+  </p:clrMapOvr>
+</p:sld>
+</file>
+
+<file path=ppt/slides/slide28.xml><?xml version="1.0" encoding="utf-8"?>
+<p:sld xmlns:a="http://schemas.openxmlformats.org/drawingml/2006/main" xmlns:r="http://schemas.openxmlformats.org/officeDocument/2006/relationships" xmlns:p="http://schemas.openxmlformats.org/presentationml/2006/main">
+  <p:cSld>
+    <p:spTree>
+      <p:nvGrpSpPr>
+        <p:cNvPr id="1" name=""/>
+        <p:cNvGrpSpPr/>
+        <p:nvPr/>
+      </p:nvGrpSpPr>
+      <p:grpSpPr>
+        <a:xfrm>
+          <a:off x="0" y="0"/>
+          <a:ext cx="0" cy="0"/>
+          <a:chOff x="0" y="0"/>
+          <a:chExt cx="0" cy="0"/>
+        </a:xfrm>
+      </p:grpSpPr>
+      <p:sp>
+        <p:nvSpPr>
+          <p:cNvPr id="2" name="TextBox 1">
+            <a:extLst>
+              <a:ext uri="{FF2B5EF4-FFF2-40B4-BE49-F238E27FC236}">
+                <a16:creationId xmlns:a16="http://schemas.microsoft.com/office/drawing/2014/main" id="{ABB6BDA9-D3EC-48B2-8801-3CE10D1D5391}"/>
+              </a:ext>
+            </a:extLst>
+          </p:cNvPr>
+          <p:cNvSpPr txBox="1"/>
+          <p:nvPr/>
+        </p:nvSpPr>
+        <p:spPr>
+          <a:xfrm>
+            <a:off x="696000" y="487357"/>
+            <a:ext cx="11160000" cy="3662541"/>
+          </a:xfrm>
+          <a:prstGeom prst="rect">
+            <a:avLst/>
+          </a:prstGeom>
+          <a:noFill/>
+        </p:spPr>
+        <p:txBody>
+          <a:bodyPr wrap="square" rtlCol="0">
+            <a:spAutoFit/>
+          </a:bodyPr>
+          <a:lstStyle/>
+          <a:p>
+            <a:pPr marL="0" indent="0" algn="ctr">
+              <a:buNone/>
+            </a:pPr>
+            <a:r>
+              <a:rPr lang="en-GB" sz="4000" b="1" dirty="0">
+                <a:solidFill>
+                  <a:prstClr val="black"/>
+                </a:solidFill>
+                <a:latin typeface="Atkinson Hyperlegible" pitchFamily="50" charset="0"/>
+                <a:ea typeface="+mj-ea"/>
+                <a:cs typeface="+mj-cs"/>
+              </a:rPr>
+              <a:t>Submit Your Workspace</a:t>
+            </a:r>
+            <a:r>
+              <a:rPr kumimoji="0" lang="en-GB" sz="4000" b="1" i="0" u="none" strike="noStrike" kern="1200" cap="none" spc="0" normalizeH="0" baseline="0" noProof="0" dirty="0">
+                <a:ln>
+                  <a:noFill/>
+                </a:ln>
+                <a:solidFill>
+                  <a:prstClr val="black"/>
+                </a:solidFill>
+                <a:effectLst/>
+                <a:uLnTx/>
+                <a:uFillTx/>
+                <a:latin typeface="Atkinson Hyperlegible" pitchFamily="50" charset="0"/>
+                <a:ea typeface="+mj-ea"/>
+                <a:cs typeface="+mj-cs"/>
+              </a:rPr>
+              <a:t> </a:t>
+            </a:r>
+          </a:p>
+          <a:p>
+            <a:pPr marL="0" indent="0" algn="ctr">
+              <a:buNone/>
+            </a:pPr>
+            <a:endParaRPr kumimoji="0" lang="en-GB" sz="2400" b="1" i="0" u="none" strike="noStrike" kern="1200" cap="none" spc="0" normalizeH="0" baseline="0" noProof="0" dirty="0">
+              <a:ln>
+                <a:noFill/>
+              </a:ln>
+              <a:solidFill>
+                <a:prstClr val="black"/>
+              </a:solidFill>
+              <a:effectLst/>
+              <a:uLnTx/>
+              <a:uFillTx/>
+              <a:latin typeface="Atkinson Hyperlegible" pitchFamily="50" charset="0"/>
+              <a:ea typeface="+mj-ea"/>
+              <a:cs typeface="+mj-cs"/>
+            </a:endParaRPr>
+          </a:p>
+          <a:p>
+            <a:pPr algn="ctr"/>
+            <a:r>
+              <a:rPr lang="en-GB" sz="2400" dirty="0">
+                <a:solidFill>
+                  <a:prstClr val="black"/>
+                </a:solidFill>
+                <a:latin typeface="Atkinson Hyperlegible" pitchFamily="50" charset="0"/>
+                <a:ea typeface="+mj-ea"/>
+                <a:cs typeface="+mj-cs"/>
+              </a:rPr>
+              <a:t>Save your workspace, with a name like:</a:t>
+            </a:r>
+          </a:p>
+          <a:p>
+            <a:pPr algn="ctr"/>
+            <a:r>
+              <a:rPr lang="en-GB" sz="2400" b="1" dirty="0" err="1">
+                <a:solidFill>
+                  <a:prstClr val="black"/>
+                </a:solidFill>
+                <a:latin typeface="Atkinson Hyperlegible" pitchFamily="50" charset="0"/>
+                <a:ea typeface="+mj-ea"/>
+                <a:cs typeface="+mj-cs"/>
+              </a:rPr>
+              <a:t>assessmentA_Your_Name.dws</a:t>
+            </a:r>
+            <a:r>
+              <a:rPr lang="en-GB" sz="2400" dirty="0">
+                <a:solidFill>
+                  <a:prstClr val="black"/>
+                </a:solidFill>
+                <a:latin typeface="Atkinson Hyperlegible" pitchFamily="50" charset="0"/>
+                <a:ea typeface="+mj-ea"/>
+                <a:cs typeface="+mj-cs"/>
+              </a:rPr>
+              <a:t> </a:t>
+            </a:r>
+          </a:p>
+          <a:p>
+            <a:pPr algn="ctr"/>
+            <a:endParaRPr lang="en-GB" sz="2400" dirty="0">
+              <a:solidFill>
+                <a:prstClr val="black"/>
+              </a:solidFill>
+              <a:latin typeface="Atkinson Hyperlegible" pitchFamily="50" charset="0"/>
+              <a:ea typeface="+mj-ea"/>
+              <a:cs typeface="+mj-cs"/>
+            </a:endParaRPr>
+          </a:p>
+          <a:p>
+            <a:pPr algn="ctr"/>
+            <a:r>
+              <a:rPr lang="en-GB" sz="2400" dirty="0">
+                <a:latin typeface="Atkinson Hyperlegible" pitchFamily="50" charset="0"/>
+                <a:ea typeface="+mj-ea"/>
+                <a:cs typeface="+mj-cs"/>
+              </a:rPr>
+              <a:t>Email to </a:t>
+            </a:r>
+            <a:r>
+              <a:rPr lang="en-GB" sz="2400" dirty="0">
+                <a:latin typeface="Atkinson Hyperlegible" pitchFamily="50" charset="0"/>
+                <a:ea typeface="+mj-ea"/>
+                <a:cs typeface="+mj-cs"/>
+                <a:hlinkClick r:id="rId2"/>
+              </a:rPr>
+              <a:t>workshops@dyalog.com</a:t>
+            </a:r>
+            <a:r>
+              <a:rPr lang="en-GB" sz="2400" dirty="0">
+                <a:latin typeface="Atkinson Hyperlegible" pitchFamily="50" charset="0"/>
+                <a:ea typeface="+mj-ea"/>
+                <a:cs typeface="+mj-cs"/>
+              </a:rPr>
+              <a:t> with a subject like: </a:t>
+            </a:r>
+          </a:p>
+          <a:p>
+            <a:pPr algn="ctr"/>
+            <a:r>
+              <a:rPr lang="en-GB" sz="2400" b="1" dirty="0">
+                <a:latin typeface="Atkinson Hyperlegible" pitchFamily="50" charset="0"/>
+                <a:ea typeface="+mj-ea"/>
+                <a:cs typeface="+mj-cs"/>
+              </a:rPr>
+              <a:t>assessment A your name</a:t>
+            </a:r>
+          </a:p>
+          <a:p>
+            <a:pPr algn="ctr"/>
+            <a:endParaRPr lang="en-GB" sz="2400" b="1" dirty="0">
+              <a:latin typeface="Atkinson Hyperlegible" pitchFamily="50" charset="0"/>
+              <a:ea typeface="+mj-ea"/>
+              <a:cs typeface="+mj-cs"/>
+            </a:endParaRPr>
+          </a:p>
+          <a:p>
+            <a:pPr algn="ctr"/>
+            <a:r>
+              <a:rPr lang="en-GB" sz="2400" dirty="0">
+                <a:latin typeface="Atkinson Hyperlegible" pitchFamily="50" charset="0"/>
+                <a:ea typeface="+mj-ea"/>
+                <a:cs typeface="+mj-cs"/>
+              </a:rPr>
+              <a:t>You can submit any time up to Monday 30</a:t>
+            </a:r>
+            <a:r>
+              <a:rPr lang="en-GB" sz="2400" baseline="30000" dirty="0">
+                <a:latin typeface="Atkinson Hyperlegible" pitchFamily="50" charset="0"/>
+                <a:ea typeface="+mj-ea"/>
+                <a:cs typeface="+mj-cs"/>
+              </a:rPr>
+              <a:t>th</a:t>
+            </a:r>
+            <a:r>
+              <a:rPr lang="en-GB" sz="2400" dirty="0">
+                <a:latin typeface="Atkinson Hyperlegible" pitchFamily="50" charset="0"/>
+                <a:ea typeface="+mj-ea"/>
+                <a:cs typeface="+mj-cs"/>
+              </a:rPr>
+              <a:t> August 12:00 IST</a:t>
+            </a:r>
+          </a:p>
+        </p:txBody>
+      </p:sp>
+    </p:spTree>
+    <p:extLst>
+      <p:ext uri="{BB962C8B-B14F-4D97-AF65-F5344CB8AC3E}">
+        <p14:creationId xmlns:p14="http://schemas.microsoft.com/office/powerpoint/2010/main" val="2274348065"/>
       </p:ext>
     </p:extLst>
   </p:cSld>

</xml_diff>

<commit_message>
submission instructions; fix task 16 (#1)
</commit_message>
<xml_diff>
--- a/assessmentA.pptx
+++ b/assessmentA.pptx
@@ -32,6 +32,7 @@
     <p:sldId id="286" r:id="rId26"/>
     <p:sldId id="287" r:id="rId27"/>
     <p:sldId id="288" r:id="rId28"/>
+    <p:sldId id="289" r:id="rId29"/>
   </p:sldIdLst>
   <p:sldSz cx="12192000" cy="6858000"/>
   <p:notesSz cx="6858000" cy="9144000"/>
@@ -4447,7 +4448,7 @@
                 <a:ea typeface="+mj-ea"/>
                 <a:cs typeface="+mj-cs"/>
               </a:rPr>
-              <a:t> and returns the amplitude of </a:t>
+              <a:t> and returns the range of </a:t>
             </a:r>
             <a:r>
               <a:rPr lang="en-GB" sz="2400" dirty="0">
@@ -6419,7 +6420,7 @@
         <p:spPr>
           <a:xfrm>
             <a:off x="696000" y="366623"/>
-            <a:ext cx="10800000" cy="4647426"/>
+            <a:ext cx="10800000" cy="5386090"/>
           </a:xfrm>
           <a:prstGeom prst="rect">
             <a:avLst/>
@@ -6560,7 +6561,7 @@
                 <a:ea typeface="+mj-ea"/>
                 <a:cs typeface="+mj-cs"/>
               </a:rPr>
-              <a:t> and returns the same vector after removing the occurrences of its most common element:</a:t>
+              <a:t> and returns the same vector after removing all occurrences of its most common elements:</a:t>
             </a:r>
           </a:p>
           <a:p>
@@ -6722,7 +6723,7 @@
                 <a:ea typeface="+mj-ea"/>
                 <a:cs typeface="+mj-cs"/>
               </a:rPr>
-              <a:t>Miiippi</a:t>
+              <a:t>Mpp</a:t>
             </a:r>
             <a:endParaRPr lang="en-GB" sz="2400" dirty="0">
               <a:solidFill>
@@ -6732,6 +6733,76 @@
               <a:ea typeface="+mj-ea"/>
               <a:cs typeface="+mj-cs"/>
             </a:endParaRPr>
+          </a:p>
+          <a:p>
+            <a:r>
+              <a:rPr lang="en-GB" sz="2400" dirty="0">
+                <a:solidFill>
+                  <a:prstClr val="black"/>
+                </a:solidFill>
+                <a:latin typeface="APL385 Unicode" panose="020B0709000202000203" pitchFamily="49" charset="0"/>
+                <a:ea typeface="+mj-ea"/>
+                <a:cs typeface="+mj-cs"/>
+              </a:rPr>
+              <a:t>     </a:t>
+            </a:r>
+            <a:r>
+              <a:rPr lang="en-GB" sz="2400" dirty="0" err="1">
+                <a:solidFill>
+                  <a:prstClr val="black"/>
+                </a:solidFill>
+                <a:latin typeface="APL385 Unicode" panose="020B0709000202000203" pitchFamily="49" charset="0"/>
+                <a:ea typeface="+mj-ea"/>
+                <a:cs typeface="+mj-cs"/>
+              </a:rPr>
+              <a:t>RemoveExtra</a:t>
+            </a:r>
+            <a:r>
+              <a:rPr lang="en-GB" sz="2400" dirty="0">
+                <a:solidFill>
+                  <a:prstClr val="black"/>
+                </a:solidFill>
+                <a:latin typeface="APL385 Unicode" panose="020B0709000202000203" pitchFamily="49" charset="0"/>
+                <a:ea typeface="+mj-ea"/>
+                <a:cs typeface="+mj-cs"/>
+              </a:rPr>
+              <a:t> '</a:t>
+            </a:r>
+            <a:r>
+              <a:rPr lang="en-GB" sz="2400" dirty="0" err="1">
+                <a:solidFill>
+                  <a:prstClr val="black"/>
+                </a:solidFill>
+                <a:latin typeface="APL385 Unicode" panose="020B0709000202000203" pitchFamily="49" charset="0"/>
+                <a:ea typeface="+mj-ea"/>
+                <a:cs typeface="+mj-cs"/>
+              </a:rPr>
+              <a:t>aaeeoox</a:t>
+            </a:r>
+            <a:r>
+              <a:rPr lang="en-GB" sz="2400" dirty="0">
+                <a:solidFill>
+                  <a:prstClr val="black"/>
+                </a:solidFill>
+                <a:latin typeface="APL385 Unicode" panose="020B0709000202000203" pitchFamily="49" charset="0"/>
+                <a:ea typeface="+mj-ea"/>
+                <a:cs typeface="+mj-cs"/>
+              </a:rPr>
+              <a:t>'</a:t>
+            </a:r>
+          </a:p>
+          <a:p>
+            <a:r>
+              <a:rPr lang="en-GB" sz="2400" dirty="0">
+                <a:solidFill>
+                  <a:prstClr val="black"/>
+                </a:solidFill>
+                <a:latin typeface="APL385 Unicode" panose="020B0709000202000203" pitchFamily="49" charset="0"/>
+                <a:ea typeface="+mj-ea"/>
+                <a:cs typeface="+mj-cs"/>
+              </a:rPr>
+              <a:t>x</a:t>
+            </a:r>
           </a:p>
         </p:txBody>
       </p:sp>
@@ -11246,6 +11317,241 @@
     <p:extLst>
       <p:ext uri="{BB962C8B-B14F-4D97-AF65-F5344CB8AC3E}">
         <p14:creationId xmlns:p14="http://schemas.microsoft.com/office/powerpoint/2010/main" val="1442737486"/>
+      </p:ext>
+    </p:extLst>
+  </p:cSld>
+  <p:clrMapOvr>
+    <a:masterClrMapping/>
+  </p:clrMapOvr>
+</p:sld>
+</file>
+
+<file path=ppt/slides/slide28.xml><?xml version="1.0" encoding="utf-8"?>
+<p:sld xmlns:a="http://schemas.openxmlformats.org/drawingml/2006/main" xmlns:r="http://schemas.openxmlformats.org/officeDocument/2006/relationships" xmlns:p="http://schemas.openxmlformats.org/presentationml/2006/main">
+  <p:cSld>
+    <p:spTree>
+      <p:nvGrpSpPr>
+        <p:cNvPr id="1" name=""/>
+        <p:cNvGrpSpPr/>
+        <p:nvPr/>
+      </p:nvGrpSpPr>
+      <p:grpSpPr>
+        <a:xfrm>
+          <a:off x="0" y="0"/>
+          <a:ext cx="0" cy="0"/>
+          <a:chOff x="0" y="0"/>
+          <a:chExt cx="0" cy="0"/>
+        </a:xfrm>
+      </p:grpSpPr>
+      <p:sp>
+        <p:nvSpPr>
+          <p:cNvPr id="2" name="TextBox 1">
+            <a:extLst>
+              <a:ext uri="{FF2B5EF4-FFF2-40B4-BE49-F238E27FC236}">
+                <a16:creationId xmlns:a16="http://schemas.microsoft.com/office/drawing/2014/main" id="{ABB6BDA9-D3EC-48B2-8801-3CE10D1D5391}"/>
+              </a:ext>
+            </a:extLst>
+          </p:cNvPr>
+          <p:cNvSpPr txBox="1"/>
+          <p:nvPr/>
+        </p:nvSpPr>
+        <p:spPr>
+          <a:xfrm>
+            <a:off x="696000" y="487357"/>
+            <a:ext cx="11160000" cy="3662541"/>
+          </a:xfrm>
+          <a:prstGeom prst="rect">
+            <a:avLst/>
+          </a:prstGeom>
+          <a:noFill/>
+        </p:spPr>
+        <p:txBody>
+          <a:bodyPr wrap="square" rtlCol="0">
+            <a:spAutoFit/>
+          </a:bodyPr>
+          <a:lstStyle/>
+          <a:p>
+            <a:pPr marL="0" indent="0" algn="ctr">
+              <a:buNone/>
+            </a:pPr>
+            <a:r>
+              <a:rPr lang="en-GB" sz="4000" b="1" dirty="0">
+                <a:solidFill>
+                  <a:prstClr val="black"/>
+                </a:solidFill>
+                <a:latin typeface="Atkinson Hyperlegible" pitchFamily="50" charset="0"/>
+                <a:ea typeface="+mj-ea"/>
+                <a:cs typeface="+mj-cs"/>
+              </a:rPr>
+              <a:t>Submit Your Workspace</a:t>
+            </a:r>
+            <a:r>
+              <a:rPr kumimoji="0" lang="en-GB" sz="4000" b="1" i="0" u="none" strike="noStrike" kern="1200" cap="none" spc="0" normalizeH="0" baseline="0" noProof="0" dirty="0">
+                <a:ln>
+                  <a:noFill/>
+                </a:ln>
+                <a:solidFill>
+                  <a:prstClr val="black"/>
+                </a:solidFill>
+                <a:effectLst/>
+                <a:uLnTx/>
+                <a:uFillTx/>
+                <a:latin typeface="Atkinson Hyperlegible" pitchFamily="50" charset="0"/>
+                <a:ea typeface="+mj-ea"/>
+                <a:cs typeface="+mj-cs"/>
+              </a:rPr>
+              <a:t> </a:t>
+            </a:r>
+          </a:p>
+          <a:p>
+            <a:pPr marL="0" indent="0" algn="ctr">
+              <a:buNone/>
+            </a:pPr>
+            <a:endParaRPr kumimoji="0" lang="en-GB" sz="2400" b="1" i="0" u="none" strike="noStrike" kern="1200" cap="none" spc="0" normalizeH="0" baseline="0" noProof="0" dirty="0">
+              <a:ln>
+                <a:noFill/>
+              </a:ln>
+              <a:solidFill>
+                <a:prstClr val="black"/>
+              </a:solidFill>
+              <a:effectLst/>
+              <a:uLnTx/>
+              <a:uFillTx/>
+              <a:latin typeface="Atkinson Hyperlegible" pitchFamily="50" charset="0"/>
+              <a:ea typeface="+mj-ea"/>
+              <a:cs typeface="+mj-cs"/>
+            </a:endParaRPr>
+          </a:p>
+          <a:p>
+            <a:pPr algn="ctr"/>
+            <a:r>
+              <a:rPr lang="en-GB" sz="2400" dirty="0">
+                <a:solidFill>
+                  <a:prstClr val="black"/>
+                </a:solidFill>
+                <a:latin typeface="Atkinson Hyperlegible" pitchFamily="50" charset="0"/>
+                <a:ea typeface="+mj-ea"/>
+                <a:cs typeface="+mj-cs"/>
+              </a:rPr>
+              <a:t>Save your workspace, with a name like:</a:t>
+            </a:r>
+          </a:p>
+          <a:p>
+            <a:pPr algn="ctr"/>
+            <a:r>
+              <a:rPr lang="en-GB" sz="2400" b="1" dirty="0" err="1">
+                <a:solidFill>
+                  <a:prstClr val="black"/>
+                </a:solidFill>
+                <a:latin typeface="Atkinson Hyperlegible" pitchFamily="50" charset="0"/>
+                <a:ea typeface="+mj-ea"/>
+                <a:cs typeface="+mj-cs"/>
+              </a:rPr>
+              <a:t>assessmentA_Your_Name.dws</a:t>
+            </a:r>
+            <a:r>
+              <a:rPr lang="en-GB" sz="2400" dirty="0">
+                <a:solidFill>
+                  <a:prstClr val="black"/>
+                </a:solidFill>
+                <a:latin typeface="Atkinson Hyperlegible" pitchFamily="50" charset="0"/>
+                <a:ea typeface="+mj-ea"/>
+                <a:cs typeface="+mj-cs"/>
+              </a:rPr>
+              <a:t> </a:t>
+            </a:r>
+          </a:p>
+          <a:p>
+            <a:pPr algn="ctr"/>
+            <a:endParaRPr lang="en-GB" sz="2400" dirty="0">
+              <a:solidFill>
+                <a:prstClr val="black"/>
+              </a:solidFill>
+              <a:latin typeface="Atkinson Hyperlegible" pitchFamily="50" charset="0"/>
+              <a:ea typeface="+mj-ea"/>
+              <a:cs typeface="+mj-cs"/>
+            </a:endParaRPr>
+          </a:p>
+          <a:p>
+            <a:pPr algn="ctr"/>
+            <a:r>
+              <a:rPr lang="en-GB" sz="2400" dirty="0">
+                <a:latin typeface="Atkinson Hyperlegible" pitchFamily="50" charset="0"/>
+                <a:ea typeface="+mj-ea"/>
+                <a:cs typeface="+mj-cs"/>
+              </a:rPr>
+              <a:t>Email to </a:t>
+            </a:r>
+            <a:r>
+              <a:rPr lang="en-GB" sz="2400" dirty="0">
+                <a:latin typeface="Atkinson Hyperlegible" pitchFamily="50" charset="0"/>
+                <a:ea typeface="+mj-ea"/>
+                <a:cs typeface="+mj-cs"/>
+                <a:hlinkClick r:id="rId2"/>
+              </a:rPr>
+              <a:t>workshops@dyalog.com</a:t>
+            </a:r>
+            <a:r>
+              <a:rPr lang="en-GB" sz="2400" dirty="0">
+                <a:latin typeface="Atkinson Hyperlegible" pitchFamily="50" charset="0"/>
+                <a:ea typeface="+mj-ea"/>
+                <a:cs typeface="+mj-cs"/>
+              </a:rPr>
+              <a:t> with a subject like: </a:t>
+            </a:r>
+          </a:p>
+          <a:p>
+            <a:pPr algn="ctr"/>
+            <a:r>
+              <a:rPr lang="en-GB" sz="2400" b="1" dirty="0">
+                <a:latin typeface="Atkinson Hyperlegible" pitchFamily="50" charset="0"/>
+                <a:ea typeface="+mj-ea"/>
+                <a:cs typeface="+mj-cs"/>
+              </a:rPr>
+              <a:t>assessment A your name</a:t>
+            </a:r>
+          </a:p>
+          <a:p>
+            <a:pPr algn="ctr"/>
+            <a:endParaRPr lang="en-GB" sz="2400" b="1" dirty="0">
+              <a:latin typeface="Atkinson Hyperlegible" pitchFamily="50" charset="0"/>
+              <a:ea typeface="+mj-ea"/>
+              <a:cs typeface="+mj-cs"/>
+            </a:endParaRPr>
+          </a:p>
+          <a:p>
+            <a:pPr algn="ctr"/>
+            <a:r>
+              <a:rPr lang="en-GB" sz="2400" dirty="0">
+                <a:latin typeface="Atkinson Hyperlegible" pitchFamily="50" charset="0"/>
+                <a:ea typeface="+mj-ea"/>
+                <a:cs typeface="+mj-cs"/>
+              </a:rPr>
+              <a:t>You can submit any time up to Monday 30</a:t>
+            </a:r>
+            <a:r>
+              <a:rPr lang="en-GB" sz="2400" baseline="30000" dirty="0">
+                <a:latin typeface="Atkinson Hyperlegible" pitchFamily="50" charset="0"/>
+                <a:ea typeface="+mj-ea"/>
+                <a:cs typeface="+mj-cs"/>
+              </a:rPr>
+              <a:t>th</a:t>
+            </a:r>
+            <a:r>
+              <a:rPr lang="en-GB" sz="2400" dirty="0">
+                <a:latin typeface="Atkinson Hyperlegible" pitchFamily="50" charset="0"/>
+                <a:ea typeface="+mj-ea"/>
+                <a:cs typeface="+mj-cs"/>
+              </a:rPr>
+              <a:t> August 12:00 IST</a:t>
+            </a:r>
+          </a:p>
+        </p:txBody>
+      </p:sp>
+    </p:spTree>
+    <p:extLst>
+      <p:ext uri="{BB962C8B-B14F-4D97-AF65-F5344CB8AC3E}">
+        <p14:creationId xmlns:p14="http://schemas.microsoft.com/office/powerpoint/2010/main" val="2274348065"/>
       </p:ext>
     </p:extLst>
   </p:cSld>

</xml_diff>